<commit_message>
Update do banner (de novo)
</commit_message>
<xml_diff>
--- a/documentos/Banner_PI_80x120_2025_2[1].pptx
+++ b/documentos/Banner_PI_80x120_2025_2[1].pptx
@@ -4291,7 +4291,7 @@
               <a:rPr lang="pt-BR" sz="3600" b="1" dirty="0">
                 <a:ea typeface="ＭＳ Ｐゴシック" pitchFamily="34" charset="-128"/>
               </a:rPr>
-              <a:t>Nosso time</a:t>
+              <a:t>Sobre a equipe</a:t>
             </a:r>
           </a:p>
           <a:p>
@@ -4304,7 +4304,15 @@
             </a:r>
             <a:r>
               <a:rPr lang="pt-BR" sz="2400" dirty="0"/>
-              <a:t>A equipe responsável pelo desenvolvimento do ##NOME DO PROJETO## é composta por </a:t>
+              <a:t>A equipe responsável pelo desenvolvimento do </a:t>
+            </a:r>
+            <a:r>
+              <a:rPr lang="pt-BR" sz="2400" dirty="0" err="1"/>
+              <a:t>PicStats</a:t>
+            </a:r>
+            <a:r>
+              <a:rPr lang="pt-BR" sz="2400" dirty="0"/>
+              <a:t> é composta por </a:t>
             </a:r>
             <a:r>
               <a:rPr lang="pt-BR" sz="2400" b="1" dirty="0"/>
@@ -4757,9 +4765,10 @@
           <a:p>
             <a:pPr eaLnBrk="1" hangingPunct="1"/>
             <a:r>
-              <a:rPr lang="pt-BR" sz="5866" b="1" dirty="0"/>
-              <a:t>PI Quente (ainda precisamos de um nome)</a:t>
-            </a:r>
+              <a:rPr lang="pt-BR" sz="5866" b="1" dirty="0" err="1"/>
+              <a:t>PicStats</a:t>
+            </a:r>
+            <a:endParaRPr lang="pt-BR" sz="5866" b="1" dirty="0"/>
           </a:p>
         </p:txBody>
       </p:sp>
@@ -5808,7 +5817,7 @@
         </p:nvSpPr>
         <p:spPr bwMode="auto">
           <a:xfrm>
-            <a:off x="92365" y="13425457"/>
+            <a:off x="7965802" y="13097819"/>
             <a:ext cx="12868819" cy="1569469"/>
           </a:xfrm>
           <a:prstGeom prst="rect">
@@ -5969,7 +5978,7 @@
         </p:blipFill>
         <p:spPr>
           <a:xfrm>
-            <a:off x="13707500" y="13103127"/>
+            <a:off x="13466347" y="15123681"/>
             <a:ext cx="2252785" cy="1689588"/>
           </a:xfrm>
           <a:prstGeom prst="rect">
@@ -6005,7 +6014,7 @@
         </p:blipFill>
         <p:spPr>
           <a:xfrm>
-            <a:off x="15934894" y="13007424"/>
+            <a:off x="15693741" y="15027978"/>
             <a:ext cx="2090947" cy="2090947"/>
           </a:xfrm>
           <a:prstGeom prst="rect">
@@ -6041,7 +6050,7 @@
         </p:blipFill>
         <p:spPr>
           <a:xfrm>
-            <a:off x="16930675" y="15334756"/>
+            <a:off x="16689522" y="17355310"/>
             <a:ext cx="3206433" cy="1516793"/>
           </a:xfrm>
           <a:prstGeom prst="rect">
@@ -6077,7 +6086,7 @@
         </p:blipFill>
         <p:spPr>
           <a:xfrm>
-            <a:off x="18676357" y="12391580"/>
+            <a:off x="18435204" y="14412134"/>
             <a:ext cx="3244379" cy="3244379"/>
           </a:xfrm>
           <a:prstGeom prst="rect">
@@ -6113,7 +6122,7 @@
         </p:blipFill>
         <p:spPr>
           <a:xfrm>
-            <a:off x="13447635" y="15063784"/>
+            <a:off x="13206482" y="17084338"/>
             <a:ext cx="3244379" cy="1898133"/>
           </a:xfrm>
           <a:prstGeom prst="rect">
@@ -6281,7 +6290,7 @@
         </p:blipFill>
         <p:spPr>
           <a:xfrm>
-            <a:off x="122752" y="16202631"/>
+            <a:off x="79744" y="16367570"/>
             <a:ext cx="12654390" cy="6322316"/>
           </a:xfrm>
           <a:prstGeom prst="rect">
@@ -6311,7 +6320,7 @@
         </p:blipFill>
         <p:spPr>
           <a:xfrm>
-            <a:off x="13110203" y="18008119"/>
+            <a:off x="13099275" y="19269888"/>
             <a:ext cx="14947160" cy="6737796"/>
           </a:xfrm>
           <a:prstGeom prst="rect">
@@ -6347,7 +6356,7 @@
         </p:blipFill>
         <p:spPr>
           <a:xfrm>
-            <a:off x="1670725" y="23957968"/>
+            <a:off x="1540883" y="24443496"/>
             <a:ext cx="8326619" cy="7151971"/>
           </a:xfrm>
           <a:prstGeom prst="rect">
@@ -6377,7 +6386,7 @@
         </p:blipFill>
         <p:spPr>
           <a:xfrm>
-            <a:off x="13092169" y="24713346"/>
+            <a:off x="13081241" y="25975115"/>
             <a:ext cx="14855619" cy="6974728"/>
           </a:xfrm>
           <a:prstGeom prst="rect">
@@ -6401,7 +6410,7 @@
         </p:nvSpPr>
         <p:spPr bwMode="auto">
           <a:xfrm>
-            <a:off x="35982" y="22561069"/>
+            <a:off x="96584" y="22880841"/>
             <a:ext cx="3874922" cy="353943"/>
           </a:xfrm>
           <a:prstGeom prst="rect">
@@ -6471,7 +6480,7 @@
         </p:nvSpPr>
         <p:spPr bwMode="auto">
           <a:xfrm>
-            <a:off x="13092169" y="31746714"/>
+            <a:off x="13081241" y="33008483"/>
             <a:ext cx="3874922" cy="353943"/>
           </a:xfrm>
           <a:prstGeom prst="rect">
@@ -6515,7 +6524,7 @@
                 </a:solidFill>
                 <a:ea typeface="ＭＳ Ｐゴシック" pitchFamily="34" charset="-128"/>
               </a:rPr>
-              <a:t>Protótipo pagina scroll </a:t>
+              <a:t>Protótipo pagina scroll-</a:t>
             </a:r>
             <a:r>
               <a:rPr lang="pt-BR" sz="1700" dirty="0" err="1">
@@ -6559,7 +6568,7 @@
         </p:nvSpPr>
         <p:spPr bwMode="auto">
           <a:xfrm>
-            <a:off x="1798812" y="31155859"/>
+            <a:off x="1668970" y="31641387"/>
             <a:ext cx="3874922" cy="353943"/>
           </a:xfrm>
           <a:prstGeom prst="rect">
@@ -6635,7 +6644,7 @@
         </p:blipFill>
         <p:spPr>
           <a:xfrm>
-            <a:off x="22422590" y="13222991"/>
+            <a:off x="22181437" y="15243545"/>
             <a:ext cx="1431922" cy="1431922"/>
           </a:xfrm>
           <a:prstGeom prst="rect">
@@ -6665,7 +6674,7 @@
         </p:blipFill>
         <p:spPr>
           <a:xfrm>
-            <a:off x="20463675" y="15376293"/>
+            <a:off x="20222522" y="17396847"/>
             <a:ext cx="4010342" cy="1622935"/>
           </a:xfrm>
           <a:prstGeom prst="rect">
@@ -6695,7 +6704,7 @@
         </p:blipFill>
         <p:spPr>
           <a:xfrm>
-            <a:off x="24648940" y="13944894"/>
+            <a:off x="24407787" y="15965448"/>
             <a:ext cx="2100064" cy="2100064"/>
           </a:xfrm>
           <a:prstGeom prst="rect">
@@ -8126,26 +8135,6 @@
 </file>
 
 <file path=customXml/item1.xml><?xml version="1.0" encoding="utf-8"?>
-<?mso-contentType ?>
-<FormTemplates xmlns="http://schemas.microsoft.com/sharepoint/v3/contenttype/forms">
-  <Display>DocumentLibraryForm</Display>
-  <Edit>DocumentLibraryForm</Edit>
-  <New>DocumentLibraryForm</New>
-</FormTemplates>
-</file>
-
-<file path=customXml/item2.xml><?xml version="1.0" encoding="utf-8"?>
-<p:properties xmlns:p="http://schemas.microsoft.com/office/2006/metadata/properties" xmlns:xsi="http://www.w3.org/2001/XMLSchema-instance" xmlns:pc="http://schemas.microsoft.com/office/infopath/2007/PartnerControls">
-  <documentManagement>
-    <lcf76f155ced4ddcb4097134ff3c332f xmlns="8ca2a57e-8138-4b57-956a-eb6e2c7049cc">
-      <Terms xmlns="http://schemas.microsoft.com/office/infopath/2007/PartnerControls"/>
-    </lcf76f155ced4ddcb4097134ff3c332f>
-    <TaxCatchAll xmlns="1d2798d9-1030-4cc5-be7b-200f9e628651" xsi:nil="true"/>
-  </documentManagement>
-</p:properties>
-</file>
-
-<file path=customXml/item3.xml><?xml version="1.0" encoding="utf-8"?>
 <ct:contentTypeSchema xmlns:ct="http://schemas.microsoft.com/office/2006/metadata/contentType" xmlns:ma="http://schemas.microsoft.com/office/2006/metadata/properties/metaAttributes" ct:_="" ma:_="" ma:contentTypeName="Documento" ma:contentTypeID="0x01010045364877AF745B4281652B53F43C594A" ma:contentTypeVersion="15" ma:contentTypeDescription="Crie um novo documento." ma:contentTypeScope="" ma:versionID="440a6fbbcbce65e3f8e2bed610644788">
   <xsd:schema xmlns:xsd="http://www.w3.org/2001/XMLSchema" xmlns:xs="http://www.w3.org/2001/XMLSchema" xmlns:p="http://schemas.microsoft.com/office/2006/metadata/properties" xmlns:ns2="1d2798d9-1030-4cc5-be7b-200f9e628651" xmlns:ns3="8ca2a57e-8138-4b57-956a-eb6e2c7049cc" targetNamespace="http://schemas.microsoft.com/office/2006/metadata/properties" ma:root="true" ma:fieldsID="3ff20d9b6411658b7762fa2c08d7e1af" ns2:_="" ns3:_="">
     <xsd:import namespace="1d2798d9-1030-4cc5-be7b-200f9e628651"/>
@@ -8380,10 +8369,41 @@
 </ct:contentTypeSchema>
 </file>
 
+<file path=customXml/item2.xml><?xml version="1.0" encoding="utf-8"?>
+<p:properties xmlns:p="http://schemas.microsoft.com/office/2006/metadata/properties" xmlns:xsi="http://www.w3.org/2001/XMLSchema-instance" xmlns:pc="http://schemas.microsoft.com/office/infopath/2007/PartnerControls">
+  <documentManagement>
+    <lcf76f155ced4ddcb4097134ff3c332f xmlns="8ca2a57e-8138-4b57-956a-eb6e2c7049cc">
+      <Terms xmlns="http://schemas.microsoft.com/office/infopath/2007/PartnerControls"/>
+    </lcf76f155ced4ddcb4097134ff3c332f>
+    <TaxCatchAll xmlns="1d2798d9-1030-4cc5-be7b-200f9e628651" xsi:nil="true"/>
+  </documentManagement>
+</p:properties>
+</file>
+
+<file path=customXml/item3.xml><?xml version="1.0" encoding="utf-8"?>
+<?mso-contentType ?>
+<FormTemplates xmlns="http://schemas.microsoft.com/sharepoint/v3/contenttype/forms">
+  <Display>DocumentLibraryForm</Display>
+  <Edit>DocumentLibraryForm</Edit>
+  <New>DocumentLibraryForm</New>
+</FormTemplates>
+</file>
+
 <file path=customXml/itemProps1.xml><?xml version="1.0" encoding="utf-8"?>
-<ds:datastoreItem xmlns:ds="http://schemas.openxmlformats.org/officeDocument/2006/customXml" ds:itemID="{20511531-72C6-41EA-909D-35A50B0891E1}">
+<ds:datastoreItem xmlns:ds="http://schemas.openxmlformats.org/officeDocument/2006/customXml" ds:itemID="{B0583F25-0BD0-426F-9D18-6079E5A02729}">
   <ds:schemaRefs>
-    <ds:schemaRef ds:uri="http://schemas.microsoft.com/sharepoint/v3/contenttype/forms"/>
+    <ds:schemaRef ds:uri="http://schemas.microsoft.com/office/2006/metadata/contentType"/>
+    <ds:schemaRef ds:uri="http://schemas.microsoft.com/office/2006/metadata/properties/metaAttributes"/>
+    <ds:schemaRef ds:uri="http://www.w3.org/2001/XMLSchema"/>
+    <ds:schemaRef ds:uri="http://schemas.microsoft.com/office/2006/metadata/properties"/>
+    <ds:schemaRef ds:uri="1d2798d9-1030-4cc5-be7b-200f9e628651"/>
+    <ds:schemaRef ds:uri="8ca2a57e-8138-4b57-956a-eb6e2c7049cc"/>
+    <ds:schemaRef ds:uri="http://schemas.microsoft.com/office/2006/documentManagement/types"/>
+    <ds:schemaRef ds:uri="http://schemas.microsoft.com/office/infopath/2007/PartnerControls"/>
+    <ds:schemaRef ds:uri="http://schemas.openxmlformats.org/package/2006/metadata/core-properties"/>
+    <ds:schemaRef ds:uri="http://purl.org/dc/elements/1.1/"/>
+    <ds:schemaRef ds:uri="http://purl.org/dc/terms/"/>
+    <ds:schemaRef ds:uri="http://schemas.microsoft.com/internal/obd"/>
   </ds:schemaRefs>
 </ds:datastoreItem>
 </file>
@@ -8406,20 +8426,9 @@
 </file>
 
 <file path=customXml/itemProps3.xml><?xml version="1.0" encoding="utf-8"?>
-<ds:datastoreItem xmlns:ds="http://schemas.openxmlformats.org/officeDocument/2006/customXml" ds:itemID="{B0583F25-0BD0-426F-9D18-6079E5A02729}">
+<ds:datastoreItem xmlns:ds="http://schemas.openxmlformats.org/officeDocument/2006/customXml" ds:itemID="{20511531-72C6-41EA-909D-35A50B0891E1}">
   <ds:schemaRefs>
-    <ds:schemaRef ds:uri="http://schemas.microsoft.com/office/2006/metadata/contentType"/>
-    <ds:schemaRef ds:uri="http://schemas.microsoft.com/office/2006/metadata/properties/metaAttributes"/>
-    <ds:schemaRef ds:uri="http://www.w3.org/2001/XMLSchema"/>
-    <ds:schemaRef ds:uri="http://schemas.microsoft.com/office/2006/metadata/properties"/>
-    <ds:schemaRef ds:uri="1d2798d9-1030-4cc5-be7b-200f9e628651"/>
-    <ds:schemaRef ds:uri="8ca2a57e-8138-4b57-956a-eb6e2c7049cc"/>
-    <ds:schemaRef ds:uri="http://schemas.microsoft.com/office/2006/documentManagement/types"/>
-    <ds:schemaRef ds:uri="http://schemas.microsoft.com/office/infopath/2007/PartnerControls"/>
-    <ds:schemaRef ds:uri="http://schemas.openxmlformats.org/package/2006/metadata/core-properties"/>
-    <ds:schemaRef ds:uri="http://purl.org/dc/elements/1.1/"/>
-    <ds:schemaRef ds:uri="http://purl.org/dc/terms/"/>
-    <ds:schemaRef ds:uri="http://schemas.microsoft.com/internal/obd"/>
+    <ds:schemaRef ds:uri="http://schemas.microsoft.com/sharepoint/v3/contenttype/forms"/>
   </ds:schemaRefs>
 </ds:datastoreItem>
 </file>
</xml_diff>